<commit_message>
Finished presentation files, next step work in a better interface for the examples
</commit_message>
<xml_diff>
--- a/Week_1/Workout1.pptx
+++ b/Week_1/Workout1.pptx
@@ -6,10 +6,10 @@
     <p:sldMasterId id="2147483652" r:id="rId2"/>
   </p:sldMasterIdLst>
   <p:notesMasterIdLst>
-    <p:notesMasterId r:id="rId11"/>
+    <p:notesMasterId r:id="rId12"/>
   </p:notesMasterIdLst>
   <p:handoutMasterIdLst>
-    <p:handoutMasterId r:id="rId12"/>
+    <p:handoutMasterId r:id="rId13"/>
   </p:handoutMasterIdLst>
   <p:sldIdLst>
     <p:sldId id="849" r:id="rId3"/>
@@ -19,7 +19,8 @@
     <p:sldId id="892" r:id="rId7"/>
     <p:sldId id="893" r:id="rId8"/>
     <p:sldId id="890" r:id="rId9"/>
-    <p:sldId id="835" r:id="rId10"/>
+    <p:sldId id="894" r:id="rId10"/>
+    <p:sldId id="895" r:id="rId11"/>
   </p:sldIdLst>
   <p:sldSz cx="9144000" cy="6858000" type="screen4x3"/>
   <p:notesSz cx="7315200" cy="9601200"/>
@@ -1138,7 +1139,7 @@
                   <a:tab pos="9665969" algn="l"/>
                 </a:tabLst>
               </a:pPr>
-              <a:t>8</a:t>
+              <a:t>9</a:t>
             </a:fld>
             <a:endParaRPr lang="en-GB" sz="1300" dirty="0">
               <a:solidFill>
@@ -1223,6 +1224,11 @@
         </p:txBody>
       </p:sp>
     </p:spTree>
+    <p:extLst>
+      <p:ext uri="{BB962C8B-B14F-4D97-AF65-F5344CB8AC3E}">
+        <p14:creationId xmlns:p14="http://schemas.microsoft.com/office/powerpoint/2010/main" val="1020456348"/>
+      </p:ext>
+    </p:extLst>
   </p:cSld>
   <p:clrMapOvr>
     <a:masterClrMapping/>
@@ -1898,7 +1904,7 @@
           <a:graphicData uri="http://schemas.openxmlformats.org/presentationml/2006/ole">
             <mc:AlternateContent xmlns:mc="http://schemas.openxmlformats.org/markup-compatibility/2006">
               <mc:Choice xmlns:v="urn:schemas-microsoft-com:vml" Requires="v">
-                <p:oleObj spid="_x0000_s713735" name="Photo Editor Photo" r:id="rId3" imgW="9142857" imgH="743054" progId="">
+                <p:oleObj spid="_x0000_s713736" name="Photo Editor Photo" r:id="rId3" imgW="9142857" imgH="743054" progId="">
                   <p:embed/>
                 </p:oleObj>
               </mc:Choice>
@@ -3527,7 +3533,7 @@
           <a:graphicData uri="http://schemas.openxmlformats.org/presentationml/2006/ole">
             <mc:AlternateContent xmlns:mc="http://schemas.openxmlformats.org/markup-compatibility/2006">
               <mc:Choice xmlns:v="urn:schemas-microsoft-com:vml" Requires="v">
-                <p:oleObj spid="_x0000_s715783" name="Photo Editor Photo" r:id="rId3" imgW="9142857" imgH="743054" progId="">
+                <p:oleObj spid="_x0000_s715784" name="Photo Editor Photo" r:id="rId3" imgW="9142857" imgH="743054" progId="">
                   <p:embed/>
                 </p:oleObj>
               </mc:Choice>
@@ -8644,7 +8650,7 @@
           <a:graphicData uri="http://schemas.openxmlformats.org/presentationml/2006/ole">
             <mc:AlternateContent xmlns:mc="http://schemas.openxmlformats.org/markup-compatibility/2006">
               <mc:Choice xmlns:v="urn:schemas-microsoft-com:vml" Requires="v">
-                <p:oleObj spid="_x0000_s1031" name="Photo Editor Photo" r:id="rId17" imgW="9142857" imgH="743054" progId="">
+                <p:oleObj spid="_x0000_s1032" name="Photo Editor Photo" r:id="rId17" imgW="9142857" imgH="743054" progId="">
                   <p:embed/>
                 </p:oleObj>
               </mc:Choice>
@@ -13075,7 +13081,7 @@
           <a:graphicData uri="http://schemas.openxmlformats.org/presentationml/2006/ole">
             <mc:AlternateContent xmlns:mc="http://schemas.openxmlformats.org/markup-compatibility/2006">
               <mc:Choice xmlns:v="urn:schemas-microsoft-com:vml" Requires="v">
-                <p:oleObj spid="_x0000_s714779" name="Photo Editor Photo" r:id="rId4" imgW="1467055" imgH="390580" progId="">
+                <p:oleObj spid="_x0000_s714784" name="Photo Editor Photo" r:id="rId4" imgW="1467055" imgH="390580" progId="">
                   <p:embed/>
                 </p:oleObj>
               </mc:Choice>
@@ -13326,7 +13332,7 @@
           <a:graphicData uri="http://schemas.openxmlformats.org/presentationml/2006/ole">
             <mc:AlternateContent xmlns:mc="http://schemas.openxmlformats.org/markup-compatibility/2006">
               <mc:Choice xmlns:v="urn:schemas-microsoft-com:vml" Requires="v">
-                <p:oleObj spid="_x0000_s714780" name="Photo Editor Photo" r:id="rId6" imgW="9142857" imgH="3610479" progId="">
+                <p:oleObj spid="_x0000_s714785" name="Photo Editor Photo" r:id="rId6" imgW="9142857" imgH="3610479" progId="">
                   <p:embed/>
                 </p:oleObj>
               </mc:Choice>
@@ -13419,7 +13425,7 @@
           <a:graphicData uri="http://schemas.openxmlformats.org/presentationml/2006/ole">
             <mc:AlternateContent xmlns:mc="http://schemas.openxmlformats.org/markup-compatibility/2006">
               <mc:Choice xmlns:v="urn:schemas-microsoft-com:vml" Requires="v">
-                <p:oleObj spid="_x0000_s714781" name="Photo Editor Photo" r:id="rId8" imgW="1142857" imgH="914286" progId="">
+                <p:oleObj spid="_x0000_s714786" name="Photo Editor Photo" r:id="rId8" imgW="1142857" imgH="914286" progId="">
                   <p:embed/>
                 </p:oleObj>
               </mc:Choice>
@@ -13512,7 +13518,7 @@
           <a:graphicData uri="http://schemas.openxmlformats.org/presentationml/2006/ole">
             <mc:AlternateContent xmlns:mc="http://schemas.openxmlformats.org/markup-compatibility/2006">
               <mc:Choice xmlns:v="urn:schemas-microsoft-com:vml" Requires="v">
-                <p:oleObj spid="_x0000_s714782" name="Photo Editor Photo" r:id="rId10" imgW="1142857" imgH="914286" progId="">
+                <p:oleObj spid="_x0000_s714787" name="Photo Editor Photo" r:id="rId10" imgW="1142857" imgH="914286" progId="">
                   <p:embed/>
                 </p:oleObj>
               </mc:Choice>
@@ -13605,7 +13611,7 @@
           <a:graphicData uri="http://schemas.openxmlformats.org/presentationml/2006/ole">
             <mc:AlternateContent xmlns:mc="http://schemas.openxmlformats.org/markup-compatibility/2006">
               <mc:Choice xmlns:v="urn:schemas-microsoft-com:vml" Requires="v">
-                <p:oleObj spid="_x0000_s714783" name="Photo Editor Photo" r:id="rId12" imgW="1142857" imgH="914286" progId="">
+                <p:oleObj spid="_x0000_s714788" name="Photo Editor Photo" r:id="rId12" imgW="1142857" imgH="914286" progId="">
                   <p:embed/>
                 </p:oleObj>
               </mc:Choice>
@@ -13732,16 +13738,7 @@
                 </a:solidFill>
                 <a:latin typeface="Tahoma" pitchFamily="34" charset="0"/>
               </a:rPr>
-              <a:t>Node.js </a:t>
-            </a:r>
-            <a:r>
-              <a:rPr lang="en-GB" sz="2600" b="1" dirty="0" smtClean="0">
-                <a:solidFill>
-                  <a:schemeClr val="bg1"/>
-                </a:solidFill>
-                <a:latin typeface="Tahoma" pitchFamily="34" charset="0"/>
-              </a:rPr>
-              <a:t>with Bootstrap, Express, React and </a:t>
+              <a:t>Node.js with Bootstrap, Express, React and </a:t>
             </a:r>
             <a:r>
               <a:rPr lang="en-GB" sz="2600" b="1" dirty="0" err="1" smtClean="0">
@@ -14167,11 +14164,11 @@
   <p:clrMapOvr>
     <a:masterClrMapping/>
   </p:clrMapOvr>
-  <mc:AlternateContent xmlns:mc="http://schemas.openxmlformats.org/markup-compatibility/2006">
-    <mc:Choice xmlns:p14="http://schemas.microsoft.com/office/powerpoint/2010/main" Requires="p14">
+  <mc:AlternateContent xmlns:mc="http://schemas.openxmlformats.org/markup-compatibility/2006" xmlns:p14="http://schemas.microsoft.com/office/powerpoint/2010/main">
+    <mc:Choice Requires="p14">
       <p:transition spd="slow" p14:dur="2000"/>
     </mc:Choice>
-    <mc:Fallback>
+    <mc:Fallback xmlns="">
       <p:transition spd="slow"/>
     </mc:Fallback>
   </mc:AlternateContent>
@@ -15417,6 +15414,196 @@
           <a:chExt cx="0" cy="0"/>
         </a:xfrm>
       </p:grpSpPr>
+      <p:sp>
+        <p:nvSpPr>
+          <p:cNvPr id="2" name="Title 1"/>
+          <p:cNvSpPr>
+            <a:spLocks noGrp="1"/>
+          </p:cNvSpPr>
+          <p:nvPr>
+            <p:ph type="title"/>
+          </p:nvPr>
+        </p:nvSpPr>
+        <p:spPr/>
+        <p:txBody>
+          <a:bodyPr/>
+          <a:lstStyle/>
+          <a:p>
+            <a:r>
+              <a:rPr lang="en-US" dirty="0"/>
+              <a:t>Node.js with Bootstrap, Express, React and Redux</a:t>
+            </a:r>
+          </a:p>
+        </p:txBody>
+      </p:sp>
+      <p:sp>
+        <p:nvSpPr>
+          <p:cNvPr id="3" name="Text Placeholder 2"/>
+          <p:cNvSpPr>
+            <a:spLocks noGrp="1"/>
+          </p:cNvSpPr>
+          <p:nvPr>
+            <p:ph type="body" sz="half" idx="1"/>
+          </p:nvPr>
+        </p:nvSpPr>
+        <p:spPr>
+          <a:xfrm>
+            <a:off x="473075" y="1042988"/>
+            <a:ext cx="6916168" cy="5135562"/>
+          </a:xfrm>
+        </p:spPr>
+        <p:txBody>
+          <a:bodyPr/>
+          <a:lstStyle/>
+          <a:p>
+            <a:r>
+              <a:rPr lang="en-US" sz="2000" u="sng" dirty="0" smtClean="0"/>
+              <a:t>LINKS</a:t>
+            </a:r>
+          </a:p>
+          <a:p>
+            <a:endParaRPr lang="en-US" sz="2000" u="sng" dirty="0"/>
+          </a:p>
+          <a:p>
+            <a:pPr>
+              <a:buFont typeface="Arial" panose="020B0604020202020204" pitchFamily="34" charset="0"/>
+              <a:buChar char="•"/>
+            </a:pPr>
+            <a:r>
+              <a:rPr lang="en-US" sz="2000" u="sng" dirty="0" smtClean="0">
+                <a:hlinkClick r:id="rId2"/>
+              </a:rPr>
+              <a:t>https://nodejs.org</a:t>
+            </a:r>
+            <a:endParaRPr lang="en-US" sz="2000" u="sng" dirty="0" smtClean="0"/>
+          </a:p>
+          <a:p>
+            <a:pPr>
+              <a:buFont typeface="Arial" panose="020B0604020202020204" pitchFamily="34" charset="0"/>
+              <a:buChar char="•"/>
+            </a:pPr>
+            <a:r>
+              <a:rPr lang="en-US" sz="2000" u="sng" dirty="0">
+                <a:hlinkClick r:id="rId3"/>
+              </a:rPr>
+              <a:t>http://expressjs.com</a:t>
+            </a:r>
+            <a:r>
+              <a:rPr lang="en-US" sz="2000" u="sng" dirty="0" smtClean="0">
+                <a:hlinkClick r:id="rId3"/>
+              </a:rPr>
+              <a:t>/</a:t>
+            </a:r>
+            <a:endParaRPr lang="en-US" sz="2000" u="sng" dirty="0" smtClean="0"/>
+          </a:p>
+          <a:p>
+            <a:pPr>
+              <a:buFont typeface="Arial" panose="020B0604020202020204" pitchFamily="34" charset="0"/>
+              <a:buChar char="•"/>
+            </a:pPr>
+            <a:r>
+              <a:rPr lang="en-US" sz="2000" u="sng" dirty="0">
+                <a:hlinkClick r:id="rId4"/>
+              </a:rPr>
+              <a:t>http://javabeat.net/expressjs-bootstrap</a:t>
+            </a:r>
+            <a:r>
+              <a:rPr lang="en-US" sz="2000" u="sng" dirty="0" smtClean="0">
+                <a:hlinkClick r:id="rId4"/>
+              </a:rPr>
+              <a:t>/</a:t>
+            </a:r>
+            <a:endParaRPr lang="en-US" sz="2000" u="sng" dirty="0" smtClean="0"/>
+          </a:p>
+          <a:p>
+            <a:pPr>
+              <a:buFont typeface="Arial" panose="020B0604020202020204" pitchFamily="34" charset="0"/>
+              <a:buChar char="•"/>
+            </a:pPr>
+            <a:endParaRPr lang="en-US" sz="2000" u="sng" dirty="0" smtClean="0"/>
+          </a:p>
+          <a:p>
+            <a:pPr>
+              <a:buFont typeface="Arial" panose="020B0604020202020204" pitchFamily="34" charset="0"/>
+              <a:buChar char="•"/>
+            </a:pPr>
+            <a:endParaRPr lang="en-US" sz="2000" u="sng" dirty="0" smtClean="0"/>
+          </a:p>
+          <a:p>
+            <a:pPr>
+              <a:buFont typeface="Arial" panose="020B0604020202020204" pitchFamily="34" charset="0"/>
+              <a:buChar char="•"/>
+            </a:pPr>
+            <a:endParaRPr lang="en-US" sz="2000" u="sng" dirty="0" smtClean="0"/>
+          </a:p>
+          <a:p>
+            <a:pPr>
+              <a:buFont typeface="Arial" panose="020B0604020202020204" pitchFamily="34" charset="0"/>
+              <a:buChar char="•"/>
+            </a:pPr>
+            <a:endParaRPr lang="en-US" sz="2000" u="sng" dirty="0"/>
+          </a:p>
+        </p:txBody>
+      </p:sp>
+      <p:sp>
+        <p:nvSpPr>
+          <p:cNvPr id="5" name="Slide Number Placeholder 4"/>
+          <p:cNvSpPr>
+            <a:spLocks noGrp="1"/>
+          </p:cNvSpPr>
+          <p:nvPr>
+            <p:ph type="sldNum" sz="quarter" idx="10"/>
+          </p:nvPr>
+        </p:nvSpPr>
+        <p:spPr/>
+        <p:txBody>
+          <a:bodyPr/>
+          <a:lstStyle/>
+          <a:p>
+            <a:pPr>
+              <a:defRPr/>
+            </a:pPr>
+            <a:fld id="{436DB259-355B-4D80-90B3-F50BCB352002}" type="slidenum">
+              <a:rPr lang="ru-RU" smtClean="0"/>
+              <a:pPr>
+                <a:defRPr/>
+              </a:pPr>
+              <a:t>8</a:t>
+            </a:fld>
+            <a:endParaRPr lang="ru-RU" dirty="0"/>
+          </a:p>
+        </p:txBody>
+      </p:sp>
+    </p:spTree>
+    <p:extLst>
+      <p:ext uri="{BB962C8B-B14F-4D97-AF65-F5344CB8AC3E}">
+        <p14:creationId xmlns:p14="http://schemas.microsoft.com/office/powerpoint/2010/main" val="3892612768"/>
+      </p:ext>
+    </p:extLst>
+  </p:cSld>
+  <p:clrMapOvr>
+    <a:masterClrMapping/>
+  </p:clrMapOvr>
+</p:sld>
+</file>
+
+<file path=ppt/slides/slide9.xml><?xml version="1.0" encoding="utf-8"?>
+<p:sld xmlns:a="http://schemas.openxmlformats.org/drawingml/2006/main" xmlns:r="http://schemas.openxmlformats.org/officeDocument/2006/relationships" xmlns:p="http://schemas.openxmlformats.org/presentationml/2006/main">
+  <p:cSld>
+    <p:spTree>
+      <p:nvGrpSpPr>
+        <p:cNvPr id="1" name=""/>
+        <p:cNvGrpSpPr/>
+        <p:nvPr/>
+      </p:nvGrpSpPr>
+      <p:grpSpPr>
+        <a:xfrm>
+          <a:off x="0" y="0"/>
+          <a:ext cx="0" cy="0"/>
+          <a:chOff x="0" y="0"/>
+          <a:chExt cx="0" cy="0"/>
+        </a:xfrm>
+      </p:grpSpPr>
       <p:graphicFrame>
         <p:nvGraphicFramePr>
           <p:cNvPr id="4098" name="Object 1"/>
@@ -15433,7 +15620,7 @@
           <a:graphicData uri="http://schemas.openxmlformats.org/presentationml/2006/ole">
             <mc:AlternateContent xmlns:mc="http://schemas.openxmlformats.org/markup-compatibility/2006">
               <mc:Choice xmlns:v="urn:schemas-microsoft-com:vml" Requires="v">
-                <p:oleObj spid="_x0000_s541723" r:id="rId4" imgW="9142857" imgH="3610479" progId="">
+                <p:oleObj spid="_x0000_s716802" r:id="rId4" imgW="9142857" imgH="3610479" progId="">
                   <p:embed/>
                 </p:oleObj>
               </mc:Choice>
@@ -15442,7 +15629,7 @@
                   <p:embed/>
                   <p:pic>
                     <p:nvPicPr>
-                      <p:cNvPr id="0" name="Object 1"/>
+                      <p:cNvPr id="4098" name="Object 1"/>
                       <p:cNvPicPr>
                         <a:picLocks noChangeAspect="1" noChangeArrowheads="1"/>
                       </p:cNvPicPr>
@@ -15507,7 +15694,7 @@
           <a:graphicData uri="http://schemas.openxmlformats.org/presentationml/2006/ole">
             <mc:AlternateContent xmlns:mc="http://schemas.openxmlformats.org/markup-compatibility/2006">
               <mc:Choice xmlns:v="urn:schemas-microsoft-com:vml" Requires="v">
-                <p:oleObj spid="_x0000_s541724" r:id="rId6" imgW="1467055" imgH="390580" progId="">
+                <p:oleObj spid="_x0000_s716803" r:id="rId6" imgW="1467055" imgH="390580" progId="">
                   <p:embed/>
                 </p:oleObj>
               </mc:Choice>
@@ -15516,7 +15703,7 @@
                   <p:embed/>
                   <p:pic>
                     <p:nvPicPr>
-                      <p:cNvPr id="0" name="Object 3"/>
+                      <p:cNvPr id="4099" name="Object 3"/>
                       <p:cNvPicPr>
                         <a:picLocks noChangeAspect="1" noChangeArrowheads="1"/>
                       </p:cNvPicPr>
@@ -15783,7 +15970,7 @@
           <a:graphicData uri="http://schemas.openxmlformats.org/presentationml/2006/ole">
             <mc:AlternateContent xmlns:mc="http://schemas.openxmlformats.org/markup-compatibility/2006">
               <mc:Choice xmlns:v="urn:schemas-microsoft-com:vml" Requires="v">
-                <p:oleObj spid="_x0000_s541725" r:id="rId8" imgW="866896" imgH="704948" progId="">
+                <p:oleObj spid="_x0000_s716804" r:id="rId8" imgW="866896" imgH="704948" progId="">
                   <p:embed/>
                 </p:oleObj>
               </mc:Choice>
@@ -15792,7 +15979,7 @@
                   <p:embed/>
                   <p:pic>
                     <p:nvPicPr>
-                      <p:cNvPr id="0" name="Object 7"/>
+                      <p:cNvPr id="4100" name="Object 7"/>
                       <p:cNvPicPr>
                         <a:picLocks noChangeAspect="1" noChangeArrowheads="1"/>
                       </p:cNvPicPr>
@@ -15857,7 +16044,7 @@
           <a:graphicData uri="http://schemas.openxmlformats.org/presentationml/2006/ole">
             <mc:AlternateContent xmlns:mc="http://schemas.openxmlformats.org/markup-compatibility/2006">
               <mc:Choice xmlns:v="urn:schemas-microsoft-com:vml" Requires="v">
-                <p:oleObj spid="_x0000_s541726" r:id="rId10" imgW="866896" imgH="704948" progId="">
+                <p:oleObj spid="_x0000_s716805" r:id="rId10" imgW="866896" imgH="704948" progId="">
                   <p:embed/>
                 </p:oleObj>
               </mc:Choice>
@@ -15866,7 +16053,7 @@
                   <p:embed/>
                   <p:pic>
                     <p:nvPicPr>
-                      <p:cNvPr id="0" name="Object 8"/>
+                      <p:cNvPr id="4101" name="Object 8"/>
                       <p:cNvPicPr>
                         <a:picLocks noChangeAspect="1" noChangeArrowheads="1"/>
                       </p:cNvPicPr>
@@ -15931,7 +16118,7 @@
           <a:graphicData uri="http://schemas.openxmlformats.org/presentationml/2006/ole">
             <mc:AlternateContent xmlns:mc="http://schemas.openxmlformats.org/markup-compatibility/2006">
               <mc:Choice xmlns:v="urn:schemas-microsoft-com:vml" Requires="v">
-                <p:oleObj spid="_x0000_s541727" r:id="rId12" imgW="866896" imgH="704948" progId="">
+                <p:oleObj spid="_x0000_s716806" r:id="rId12" imgW="866896" imgH="704948" progId="">
                   <p:embed/>
                 </p:oleObj>
               </mc:Choice>
@@ -15940,7 +16127,7 @@
                   <p:embed/>
                   <p:pic>
                     <p:nvPicPr>
-                      <p:cNvPr id="0" name="Object 9"/>
+                      <p:cNvPr id="4102" name="Object 9"/>
                       <p:cNvPicPr>
                         <a:picLocks noChangeAspect="1" noChangeArrowheads="1"/>
                       </p:cNvPicPr>
@@ -16000,7 +16187,7 @@
         <p:grpSpPr bwMode="auto">
           <a:xfrm>
             <a:off x="993775" y="3524251"/>
-            <a:ext cx="7410451" cy="2476501"/>
+            <a:ext cx="7410451" cy="2071859"/>
             <a:chOff x="626" y="2220"/>
             <a:chExt cx="4668" cy="1560"/>
           </a:xfrm>
@@ -16016,7 +16203,7 @@
           <p:spPr bwMode="auto">
             <a:xfrm>
               <a:off x="626" y="2220"/>
-              <a:ext cx="2026" cy="1559"/>
+              <a:ext cx="2482" cy="1214"/>
             </a:xfrm>
             <a:prstGeom prst="rect">
               <a:avLst/>
@@ -16257,7 +16444,6 @@
                 <a:solidFill>
                   <a:srgbClr val="CCCCFF"/>
                 </a:solidFill>
-                <a:hlinkClick r:id="rId14"/>
               </a:endParaRPr>
             </a:p>
             <a:p>
@@ -16296,27 +16482,31 @@
                 </a:tabLst>
               </a:pPr>
               <a:r>
-                <a:rPr lang="en-US" sz="1100" dirty="0" err="1" smtClean="0">
+                <a:rPr lang="en-US" sz="1400" dirty="0">
                   <a:solidFill>
-                    <a:srgbClr val="FF0000"/>
+                    <a:srgbClr val="C8CF60"/>
                   </a:solidFill>
-                  <a:hlinkClick r:id="rId14"/>
+                  <a:ea typeface="Tahoma" panose="020B0604030504040204" pitchFamily="34" charset="0"/>
+                  <a:cs typeface="Tahoma" panose="020B0604030504040204" pitchFamily="34" charset="0"/>
                 </a:rPr>
                 <a:t>Fabian_Jaramillo_ordonez</a:t>
               </a:r>
               <a:r>
-                <a:rPr lang="en-GB" sz="1100" dirty="0" smtClean="0">
+                <a:rPr lang="en-GB" sz="1400" dirty="0">
                   <a:solidFill>
-                    <a:srgbClr val="FF0000"/>
+                    <a:srgbClr val="C8CF60"/>
                   </a:solidFill>
-                  <a:hlinkClick r:id="rId14"/>
+                  <a:ea typeface="Tahoma" panose="020B0604030504040204" pitchFamily="34" charset="0"/>
+                  <a:cs typeface="Tahoma" panose="020B0604030504040204" pitchFamily="34" charset="0"/>
                 </a:rPr>
                 <a:t>@epam.com</a:t>
               </a:r>
-              <a:endParaRPr lang="en-GB" sz="1100" dirty="0">
+              <a:endParaRPr lang="en-GB" sz="1400" dirty="0">
                 <a:solidFill>
-                  <a:srgbClr val="FF0000"/>
+                  <a:srgbClr val="C8CF60"/>
                 </a:solidFill>
+                <a:ea typeface="Tahoma" panose="020B0604030504040204" pitchFamily="34" charset="0"/>
+                <a:cs typeface="Tahoma" panose="020B0604030504040204" pitchFamily="34" charset="0"/>
                 <a:hlinkClick r:id="rId14"/>
               </a:endParaRPr>
             </a:p>
@@ -16751,6 +16941,11 @@
         </p:sp>
       </p:grpSp>
     </p:spTree>
+    <p:extLst>
+      <p:ext uri="{BB962C8B-B14F-4D97-AF65-F5344CB8AC3E}">
+        <p14:creationId xmlns:p14="http://schemas.microsoft.com/office/powerpoint/2010/main" val="1281635006"/>
+      </p:ext>
+    </p:extLst>
   </p:cSld>
   <p:clrMapOvr>
     <a:masterClrMapping/>

</xml_diff>